<commit_message>
added digital transformation Atype BType
</commit_message>
<xml_diff>
--- a/_posts/does-anyone-really-understand-digital-transformation-not-according-to-research/images/images.pptx
+++ b/_posts/does-anyone-really-understand-digital-transformation-not-according-to-research/images/images.pptx
@@ -209,7 +209,7 @@
           <a:p>
             <a:fld id="{62924530-CF84-1B40-843A-DCBB2D2C09C6}" type="datetimeFigureOut">
               <a:rPr lang="en-US" smtClean="0"/>
-              <a:t>2/6/17</a:t>
+              <a:t>3/16/17</a:t>
             </a:fld>
             <a:endParaRPr lang="en-US" dirty="0"/>
           </a:p>
@@ -658,7 +658,7 @@
           <a:p>
             <a:fld id="{32612CC4-9DB0-CC43-B1FC-8D75BA765907}" type="datetimeFigureOut">
               <a:rPr lang="en-US" smtClean="0"/>
-              <a:t>2/6/17</a:t>
+              <a:t>3/16/17</a:t>
             </a:fld>
             <a:endParaRPr lang="en-US" dirty="0"/>
           </a:p>
@@ -828,7 +828,7 @@
           <a:p>
             <a:fld id="{32612CC4-9DB0-CC43-B1FC-8D75BA765907}" type="datetimeFigureOut">
               <a:rPr lang="en-US" smtClean="0"/>
-              <a:t>2/6/17</a:t>
+              <a:t>3/16/17</a:t>
             </a:fld>
             <a:endParaRPr lang="en-US" dirty="0"/>
           </a:p>
@@ -1008,7 +1008,7 @@
           <a:p>
             <a:fld id="{32612CC4-9DB0-CC43-B1FC-8D75BA765907}" type="datetimeFigureOut">
               <a:rPr lang="en-US" smtClean="0"/>
-              <a:t>2/6/17</a:t>
+              <a:t>3/16/17</a:t>
             </a:fld>
             <a:endParaRPr lang="en-US" dirty="0"/>
           </a:p>
@@ -1178,7 +1178,7 @@
           <a:p>
             <a:fld id="{32612CC4-9DB0-CC43-B1FC-8D75BA765907}" type="datetimeFigureOut">
               <a:rPr lang="en-US" smtClean="0"/>
-              <a:t>2/6/17</a:t>
+              <a:t>3/16/17</a:t>
             </a:fld>
             <a:endParaRPr lang="en-US" dirty="0"/>
           </a:p>
@@ -1424,7 +1424,7 @@
           <a:p>
             <a:fld id="{32612CC4-9DB0-CC43-B1FC-8D75BA765907}" type="datetimeFigureOut">
               <a:rPr lang="en-US" smtClean="0"/>
-              <a:t>2/6/17</a:t>
+              <a:t>3/16/17</a:t>
             </a:fld>
             <a:endParaRPr lang="en-US" dirty="0"/>
           </a:p>
@@ -1712,7 +1712,7 @@
           <a:p>
             <a:fld id="{32612CC4-9DB0-CC43-B1FC-8D75BA765907}" type="datetimeFigureOut">
               <a:rPr lang="en-US" smtClean="0"/>
-              <a:t>2/6/17</a:t>
+              <a:t>3/16/17</a:t>
             </a:fld>
             <a:endParaRPr lang="en-US" dirty="0"/>
           </a:p>
@@ -2134,7 +2134,7 @@
           <a:p>
             <a:fld id="{32612CC4-9DB0-CC43-B1FC-8D75BA765907}" type="datetimeFigureOut">
               <a:rPr lang="en-US" smtClean="0"/>
-              <a:t>2/6/17</a:t>
+              <a:t>3/16/17</a:t>
             </a:fld>
             <a:endParaRPr lang="en-US" dirty="0"/>
           </a:p>
@@ -2252,7 +2252,7 @@
           <a:p>
             <a:fld id="{32612CC4-9DB0-CC43-B1FC-8D75BA765907}" type="datetimeFigureOut">
               <a:rPr lang="en-US" smtClean="0"/>
-              <a:t>2/6/17</a:t>
+              <a:t>3/16/17</a:t>
             </a:fld>
             <a:endParaRPr lang="en-US" dirty="0"/>
           </a:p>
@@ -2347,7 +2347,7 @@
           <a:p>
             <a:fld id="{32612CC4-9DB0-CC43-B1FC-8D75BA765907}" type="datetimeFigureOut">
               <a:rPr lang="en-US" smtClean="0"/>
-              <a:t>2/6/17</a:t>
+              <a:t>3/16/17</a:t>
             </a:fld>
             <a:endParaRPr lang="en-US" dirty="0"/>
           </a:p>
@@ -2624,7 +2624,7 @@
           <a:p>
             <a:fld id="{32612CC4-9DB0-CC43-B1FC-8D75BA765907}" type="datetimeFigureOut">
               <a:rPr lang="en-US" smtClean="0"/>
-              <a:t>2/6/17</a:t>
+              <a:t>3/16/17</a:t>
             </a:fld>
             <a:endParaRPr lang="en-US" dirty="0"/>
           </a:p>
@@ -2877,7 +2877,7 @@
           <a:p>
             <a:fld id="{32612CC4-9DB0-CC43-B1FC-8D75BA765907}" type="datetimeFigureOut">
               <a:rPr lang="en-US" smtClean="0"/>
-              <a:t>2/6/17</a:t>
+              <a:t>3/16/17</a:t>
             </a:fld>
             <a:endParaRPr lang="en-US" dirty="0"/>
           </a:p>
@@ -3090,7 +3090,7 @@
           <a:p>
             <a:fld id="{32612CC4-9DB0-CC43-B1FC-8D75BA765907}" type="datetimeFigureOut">
               <a:rPr lang="en-US" smtClean="0"/>
-              <a:t>2/6/17</a:t>
+              <a:t>3/16/17</a:t>
             </a:fld>
             <a:endParaRPr lang="en-US" dirty="0"/>
           </a:p>
@@ -3504,14 +3504,95 @@
       </p:grpSpPr>
       <p:sp>
         <p:nvSpPr>
-          <p:cNvPr id="23" name="Rectangle 22"/>
+          <p:cNvPr id="16" name="Rectangle 15"/>
           <p:cNvSpPr/>
           <p:nvPr/>
         </p:nvSpPr>
         <p:spPr>
           <a:xfrm>
-            <a:off x="1621535" y="2084832"/>
-            <a:ext cx="2499360" cy="719296"/>
+            <a:off x="1636774" y="3912432"/>
+            <a:ext cx="5396482" cy="1430022"/>
+          </a:xfrm>
+          <a:prstGeom prst="rect">
+            <a:avLst/>
+          </a:prstGeom>
+          <a:solidFill>
+            <a:srgbClr val="00B0F0"/>
+          </a:solidFill>
+          <a:ln>
+            <a:noFill/>
+          </a:ln>
+          <a:effectLst/>
+        </p:spPr>
+        <p:style>
+          <a:lnRef idx="3">
+            <a:schemeClr val="lt1"/>
+          </a:lnRef>
+          <a:fillRef idx="1">
+            <a:schemeClr val="accent3"/>
+          </a:fillRef>
+          <a:effectRef idx="1">
+            <a:schemeClr val="accent3"/>
+          </a:effectRef>
+          <a:fontRef idx="minor">
+            <a:schemeClr val="lt1"/>
+          </a:fontRef>
+        </p:style>
+        <p:txBody>
+          <a:bodyPr rtlCol="0" anchor="ctr"/>
+          <a:lstStyle/>
+          <a:p>
+            <a:pPr algn="ctr"/>
+            <a:r>
+              <a:rPr lang="en-US" dirty="0" smtClean="0">
+                <a:solidFill>
+                  <a:schemeClr val="bg1"/>
+                </a:solidFill>
+              </a:rPr>
+              <a:t>A/B</a:t>
+            </a:r>
+            <a:r>
+              <a:rPr lang="en-US" dirty="0" smtClean="0">
+                <a:solidFill>
+                  <a:schemeClr val="bg1"/>
+                </a:solidFill>
+              </a:rPr>
+              <a:t>-Type (bi-directional </a:t>
+            </a:r>
+            <a:r>
+              <a:rPr lang="en-US" dirty="0">
+                <a:solidFill>
+                  <a:schemeClr val="bg1"/>
+                </a:solidFill>
+              </a:rPr>
+              <a:t>v</a:t>
+            </a:r>
+            <a:r>
+              <a:rPr lang="en-US" dirty="0" smtClean="0">
+                <a:solidFill>
+                  <a:schemeClr val="bg1"/>
+                </a:solidFill>
+              </a:rPr>
+              <a:t>ision and data)</a:t>
+            </a:r>
+            <a:endParaRPr lang="en-US" dirty="0">
+              <a:solidFill>
+                <a:schemeClr val="bg1"/>
+              </a:solidFill>
+            </a:endParaRPr>
+          </a:p>
+        </p:txBody>
+      </p:sp>
+      <p:sp>
+        <p:nvSpPr>
+          <p:cNvPr id="25" name="Rectangle 24"/>
+          <p:cNvSpPr/>
+          <p:nvPr/>
+        </p:nvSpPr>
+        <p:spPr>
+          <a:xfrm>
+            <a:off x="4567425" y="2557081"/>
+            <a:ext cx="2465831" cy="1271623"/>
           </a:xfrm>
           <a:prstGeom prst="rect">
             <a:avLst/>
@@ -3546,12 +3627,31 @@
           <a:p>
             <a:pPr algn="ctr"/>
             <a:r>
-              <a:rPr lang="en-US" smtClean="0">
+              <a:rPr lang="en-US" dirty="0">
                 <a:solidFill>
                   <a:schemeClr val="bg1"/>
                 </a:solidFill>
               </a:rPr>
-              <a:t>Digital Competency</a:t>
+              <a:t>B</a:t>
+            </a:r>
+            <a:r>
+              <a:rPr lang="en-US" dirty="0" smtClean="0">
+                <a:solidFill>
+                  <a:schemeClr val="bg1"/>
+                </a:solidFill>
+              </a:rPr>
+              <a:t>-Type (data flows </a:t>
+            </a:r>
+          </a:p>
+          <a:p>
+            <a:pPr algn="ctr"/>
+            <a:r>
+              <a:rPr lang="en-US" dirty="0" smtClean="0">
+                <a:solidFill>
+                  <a:schemeClr val="bg1"/>
+                </a:solidFill>
+              </a:rPr>
+              <a:t>up)</a:t>
             </a:r>
             <a:endParaRPr lang="en-US" dirty="0">
               <a:solidFill>
@@ -3563,14 +3663,14 @@
       </p:sp>
       <p:sp>
         <p:nvSpPr>
-          <p:cNvPr id="14" name="Rectangle 13"/>
+          <p:cNvPr id="23" name="Rectangle 22"/>
           <p:cNvSpPr/>
           <p:nvPr/>
         </p:nvSpPr>
         <p:spPr>
           <a:xfrm>
-            <a:off x="1621535" y="4267200"/>
-            <a:ext cx="2499360" cy="719296"/>
+            <a:off x="1636774" y="2557081"/>
+            <a:ext cx="2465831" cy="1271623"/>
           </a:xfrm>
           <a:prstGeom prst="rect">
             <a:avLst/>
@@ -3610,7 +3710,7 @@
                   <a:schemeClr val="bg1"/>
                 </a:solidFill>
               </a:rPr>
-              <a:t>Digital Transformation</a:t>
+              <a:t>A-Type (vision flows down)</a:t>
             </a:r>
             <a:endParaRPr lang="en-US" dirty="0">
               <a:solidFill>
@@ -3622,244 +3722,14 @@
       </p:sp>
       <p:sp>
         <p:nvSpPr>
-          <p:cNvPr id="15" name="Rectangle 14"/>
-          <p:cNvSpPr/>
-          <p:nvPr/>
-        </p:nvSpPr>
-        <p:spPr>
-          <a:xfrm>
-            <a:off x="1621535" y="3176016"/>
-            <a:ext cx="2499360" cy="719296"/>
-          </a:xfrm>
-          <a:prstGeom prst="rect">
-            <a:avLst/>
-          </a:prstGeom>
-          <a:solidFill>
-            <a:schemeClr val="bg1">
-              <a:lumMod val="65000"/>
-            </a:schemeClr>
-          </a:solidFill>
-          <a:ln>
-            <a:noFill/>
-          </a:ln>
-          <a:effectLst/>
-        </p:spPr>
-        <p:style>
-          <a:lnRef idx="3">
-            <a:schemeClr val="lt1"/>
-          </a:lnRef>
-          <a:fillRef idx="1">
-            <a:schemeClr val="accent3"/>
-          </a:fillRef>
-          <a:effectRef idx="1">
-            <a:schemeClr val="accent3"/>
-          </a:effectRef>
-          <a:fontRef idx="minor">
-            <a:schemeClr val="lt1"/>
-          </a:fontRef>
-        </p:style>
-        <p:txBody>
-          <a:bodyPr rtlCol="0" anchor="ctr"/>
-          <a:lstStyle/>
-          <a:p>
-            <a:pPr algn="ctr"/>
-            <a:r>
-              <a:rPr lang="en-US" smtClean="0">
-                <a:solidFill>
-                  <a:schemeClr val="bg1"/>
-                </a:solidFill>
-              </a:rPr>
-              <a:t>Digital Literacy</a:t>
-            </a:r>
-            <a:endParaRPr lang="en-US" dirty="0">
-              <a:solidFill>
-                <a:schemeClr val="bg1"/>
-              </a:solidFill>
-            </a:endParaRPr>
-          </a:p>
-        </p:txBody>
-      </p:sp>
-      <p:sp>
-        <p:nvSpPr>
-          <p:cNvPr id="17" name="Rectangle 16"/>
-          <p:cNvSpPr/>
-          <p:nvPr/>
-        </p:nvSpPr>
-        <p:spPr>
-          <a:xfrm rot="10800000">
-            <a:off x="4590288" y="1353344"/>
-            <a:ext cx="2663952" cy="4486624"/>
-          </a:xfrm>
-          <a:prstGeom prst="rect">
-            <a:avLst/>
-          </a:prstGeom>
-          <a:gradFill>
-            <a:gsLst>
-              <a:gs pos="0">
-                <a:srgbClr val="7030A0"/>
-              </a:gs>
-              <a:gs pos="100000">
-                <a:srgbClr val="C00000"/>
-              </a:gs>
-            </a:gsLst>
-            <a:lin ang="5400000" scaled="1"/>
-          </a:gradFill>
-          <a:ln>
-            <a:noFill/>
-          </a:ln>
-          <a:effectLst/>
-        </p:spPr>
-        <p:style>
-          <a:lnRef idx="3">
-            <a:schemeClr val="lt1"/>
-          </a:lnRef>
-          <a:fillRef idx="1">
-            <a:schemeClr val="accent3"/>
-          </a:fillRef>
-          <a:effectRef idx="1">
-            <a:schemeClr val="accent3"/>
-          </a:effectRef>
-          <a:fontRef idx="minor">
-            <a:schemeClr val="lt1"/>
-          </a:fontRef>
-        </p:style>
-        <p:txBody>
-          <a:bodyPr rtlCol="0" anchor="ctr"/>
-          <a:lstStyle/>
-          <a:p>
-            <a:pPr algn="ctr"/>
-            <a:endParaRPr lang="en-US" dirty="0">
-              <a:solidFill>
-                <a:schemeClr val="bg1"/>
-              </a:solidFill>
-            </a:endParaRPr>
-          </a:p>
-        </p:txBody>
-      </p:sp>
-      <p:sp>
-        <p:nvSpPr>
-          <p:cNvPr id="19" name="Rectangle 18"/>
-          <p:cNvSpPr/>
-          <p:nvPr/>
-        </p:nvSpPr>
-        <p:spPr>
-          <a:xfrm>
-            <a:off x="5059680" y="1545400"/>
-            <a:ext cx="1725168" cy="466312"/>
-          </a:xfrm>
-          <a:prstGeom prst="rect">
-            <a:avLst/>
-          </a:prstGeom>
-          <a:solidFill>
-            <a:srgbClr val="00B0F0"/>
-          </a:solidFill>
-          <a:ln>
-            <a:noFill/>
-          </a:ln>
-          <a:effectLst/>
-        </p:spPr>
-        <p:style>
-          <a:lnRef idx="3">
-            <a:schemeClr val="lt1"/>
-          </a:lnRef>
-          <a:fillRef idx="1">
-            <a:schemeClr val="accent3"/>
-          </a:fillRef>
-          <a:effectRef idx="1">
-            <a:schemeClr val="accent3"/>
-          </a:effectRef>
-          <a:fontRef idx="minor">
-            <a:schemeClr val="lt1"/>
-          </a:fontRef>
-        </p:style>
-        <p:txBody>
-          <a:bodyPr rtlCol="0" anchor="ctr"/>
-          <a:lstStyle/>
-          <a:p>
-            <a:pPr algn="ctr"/>
-            <a:r>
-              <a:rPr lang="en-US" smtClean="0">
-                <a:solidFill>
-                  <a:schemeClr val="bg1"/>
-                </a:solidFill>
-              </a:rPr>
-              <a:t>COST</a:t>
-            </a:r>
-            <a:endParaRPr lang="en-US" dirty="0">
-              <a:solidFill>
-                <a:schemeClr val="bg1"/>
-              </a:solidFill>
-            </a:endParaRPr>
-          </a:p>
-        </p:txBody>
-      </p:sp>
-      <p:sp>
-        <p:nvSpPr>
-          <p:cNvPr id="20" name="Rectangle 19"/>
-          <p:cNvSpPr/>
-          <p:nvPr/>
-        </p:nvSpPr>
-        <p:spPr>
-          <a:xfrm>
-            <a:off x="5059680" y="4998688"/>
-            <a:ext cx="1725168" cy="466312"/>
-          </a:xfrm>
-          <a:prstGeom prst="rect">
-            <a:avLst/>
-          </a:prstGeom>
-          <a:solidFill>
-            <a:srgbClr val="00B0F0"/>
-          </a:solidFill>
-          <a:ln>
-            <a:noFill/>
-          </a:ln>
-          <a:effectLst/>
-        </p:spPr>
-        <p:style>
-          <a:lnRef idx="3">
-            <a:schemeClr val="lt1"/>
-          </a:lnRef>
-          <a:fillRef idx="1">
-            <a:schemeClr val="accent3"/>
-          </a:fillRef>
-          <a:effectRef idx="1">
-            <a:schemeClr val="accent3"/>
-          </a:effectRef>
-          <a:fontRef idx="minor">
-            <a:schemeClr val="lt1"/>
-          </a:fontRef>
-        </p:style>
-        <p:txBody>
-          <a:bodyPr rtlCol="0" anchor="ctr"/>
-          <a:lstStyle/>
-          <a:p>
-            <a:pPr algn="ctr"/>
-            <a:r>
-              <a:rPr lang="en-US" dirty="0" smtClean="0">
-                <a:solidFill>
-                  <a:schemeClr val="bg1"/>
-                </a:solidFill>
-              </a:rPr>
-              <a:t>OPPORTUNITY</a:t>
-            </a:r>
-            <a:endParaRPr lang="en-US" dirty="0">
-              <a:solidFill>
-                <a:schemeClr val="bg1"/>
-              </a:solidFill>
-            </a:endParaRPr>
-          </a:p>
-        </p:txBody>
-      </p:sp>
-      <p:sp>
-        <p:nvSpPr>
           <p:cNvPr id="4" name="TextBox 3"/>
           <p:cNvSpPr txBox="1"/>
           <p:nvPr/>
         </p:nvSpPr>
         <p:spPr>
           <a:xfrm>
-            <a:off x="2359151" y="609044"/>
-            <a:ext cx="4425697" cy="369332"/>
+            <a:off x="2923028" y="1489015"/>
+            <a:ext cx="2877312" cy="830997"/>
           </a:xfrm>
           <a:prstGeom prst="rect">
             <a:avLst/>
@@ -3872,14 +3742,163 @@
           </a:bodyPr>
           <a:lstStyle/>
           <a:p>
-            <a:r>
-              <a:rPr lang="en-US" dirty="0" smtClean="0"/>
-              <a:t>THE PARADOX OF DIGITAL TRANSFORMATION</a:t>
-            </a:r>
-            <a:endParaRPr lang="en-US" dirty="0"/>
-          </a:p>
-        </p:txBody>
-      </p:sp>
+            <a:pPr algn="ctr"/>
+            <a:r>
+              <a:rPr lang="en-US" sz="2400" dirty="0" smtClean="0"/>
+              <a:t>The A+B Transformation</a:t>
+            </a:r>
+            <a:endParaRPr lang="en-US" sz="2400" dirty="0"/>
+          </a:p>
+        </p:txBody>
+      </p:sp>
+      <p:cxnSp>
+        <p:nvCxnSpPr>
+          <p:cNvPr id="3" name="Straight Arrow Connector 2"/>
+          <p:cNvCxnSpPr/>
+          <p:nvPr/>
+        </p:nvCxnSpPr>
+        <p:spPr>
+          <a:xfrm>
+            <a:off x="3944108" y="2640809"/>
+            <a:ext cx="0" cy="1104170"/>
+          </a:xfrm>
+          <a:prstGeom prst="straightConnector1">
+            <a:avLst/>
+          </a:prstGeom>
+          <a:ln w="50800">
+            <a:solidFill>
+              <a:srgbClr val="92D050"/>
+            </a:solidFill>
+            <a:tailEnd type="triangle"/>
+          </a:ln>
+          <a:effectLst/>
+        </p:spPr>
+        <p:style>
+          <a:lnRef idx="2">
+            <a:schemeClr val="accent1"/>
+          </a:lnRef>
+          <a:fillRef idx="0">
+            <a:schemeClr val="accent1"/>
+          </a:fillRef>
+          <a:effectRef idx="1">
+            <a:schemeClr val="accent1"/>
+          </a:effectRef>
+          <a:fontRef idx="minor">
+            <a:schemeClr val="tx1"/>
+          </a:fontRef>
+        </p:style>
+      </p:cxnSp>
+      <p:cxnSp>
+        <p:nvCxnSpPr>
+          <p:cNvPr id="11" name="Straight Arrow Connector 10"/>
+          <p:cNvCxnSpPr/>
+          <p:nvPr/>
+        </p:nvCxnSpPr>
+        <p:spPr>
+          <a:xfrm>
+            <a:off x="6611110" y="4169664"/>
+            <a:ext cx="9141" cy="1009285"/>
+          </a:xfrm>
+          <a:prstGeom prst="straightConnector1">
+            <a:avLst/>
+          </a:prstGeom>
+          <a:ln w="50800">
+            <a:solidFill>
+              <a:srgbClr val="92D050"/>
+            </a:solidFill>
+            <a:tailEnd type="triangle"/>
+          </a:ln>
+          <a:effectLst/>
+        </p:spPr>
+        <p:style>
+          <a:lnRef idx="2">
+            <a:schemeClr val="accent1"/>
+          </a:lnRef>
+          <a:fillRef idx="0">
+            <a:schemeClr val="accent1"/>
+          </a:fillRef>
+          <a:effectRef idx="1">
+            <a:schemeClr val="accent1"/>
+          </a:effectRef>
+          <a:fontRef idx="minor">
+            <a:schemeClr val="tx1"/>
+          </a:fontRef>
+        </p:style>
+      </p:cxnSp>
+      <p:cxnSp>
+        <p:nvCxnSpPr>
+          <p:cNvPr id="24" name="Straight Arrow Connector 23"/>
+          <p:cNvCxnSpPr/>
+          <p:nvPr/>
+        </p:nvCxnSpPr>
+        <p:spPr>
+          <a:xfrm flipH="1" flipV="1">
+            <a:off x="6888476" y="2640809"/>
+            <a:ext cx="9146" cy="1104170"/>
+          </a:xfrm>
+          <a:prstGeom prst="straightConnector1">
+            <a:avLst/>
+          </a:prstGeom>
+          <a:ln w="50800">
+            <a:solidFill>
+              <a:srgbClr val="92D050"/>
+            </a:solidFill>
+            <a:tailEnd type="triangle"/>
+          </a:ln>
+          <a:effectLst/>
+        </p:spPr>
+        <p:style>
+          <a:lnRef idx="2">
+            <a:schemeClr val="accent1"/>
+          </a:lnRef>
+          <a:fillRef idx="0">
+            <a:schemeClr val="accent1"/>
+          </a:fillRef>
+          <a:effectRef idx="1">
+            <a:schemeClr val="accent1"/>
+          </a:effectRef>
+          <a:fontRef idx="minor">
+            <a:schemeClr val="tx1"/>
+          </a:fontRef>
+        </p:style>
+      </p:cxnSp>
+      <p:cxnSp>
+        <p:nvCxnSpPr>
+          <p:cNvPr id="31" name="Straight Arrow Connector 30"/>
+          <p:cNvCxnSpPr/>
+          <p:nvPr/>
+        </p:nvCxnSpPr>
+        <p:spPr>
+          <a:xfrm flipV="1">
+            <a:off x="6822180" y="4122801"/>
+            <a:ext cx="4573" cy="1031764"/>
+          </a:xfrm>
+          <a:prstGeom prst="straightConnector1">
+            <a:avLst/>
+          </a:prstGeom>
+          <a:ln w="50800">
+            <a:solidFill>
+              <a:srgbClr val="92D050"/>
+            </a:solidFill>
+            <a:tailEnd type="triangle"/>
+          </a:ln>
+          <a:effectLst/>
+        </p:spPr>
+        <p:style>
+          <a:lnRef idx="2">
+            <a:schemeClr val="accent1"/>
+          </a:lnRef>
+          <a:fillRef idx="0">
+            <a:schemeClr val="accent1"/>
+          </a:fillRef>
+          <a:effectRef idx="1">
+            <a:schemeClr val="accent1"/>
+          </a:effectRef>
+          <a:fontRef idx="minor">
+            <a:schemeClr val="tx1"/>
+          </a:fontRef>
+        </p:style>
+      </p:cxnSp>
     </p:spTree>
     <p:extLst>
       <p:ext uri="{BB962C8B-B14F-4D97-AF65-F5344CB8AC3E}">
@@ -3969,7 +3988,7 @@
                                           </p:stCondLst>
                                         </p:cTn>
                                         <p:tgtEl>
-                                          <p:spTgt spid="14"/>
+                                          <p:spTgt spid="16"/>
                                         </p:tgtEl>
                                         <p:attrNameLst>
                                           <p:attrName>style.visibility</p:attrName>
@@ -4014,142 +4033,7 @@
                                           </p:stCondLst>
                                         </p:cTn>
                                         <p:tgtEl>
-                                          <p:spTgt spid="15"/>
-                                        </p:tgtEl>
-                                        <p:attrNameLst>
-                                          <p:attrName>style.visibility</p:attrName>
-                                        </p:attrNameLst>
-                                      </p:cBhvr>
-                                      <p:to>
-                                        <p:strVal val="visible"/>
-                                      </p:to>
-                                    </p:set>
-                                  </p:childTnLst>
-                                </p:cTn>
-                              </p:par>
-                            </p:childTnLst>
-                          </p:cTn>
-                        </p:par>
-                      </p:childTnLst>
-                    </p:cTn>
-                  </p:par>
-                  <p:par>
-                    <p:cTn id="15" fill="hold">
-                      <p:stCondLst>
-                        <p:cond delay="indefinite"/>
-                      </p:stCondLst>
-                      <p:childTnLst>
-                        <p:par>
-                          <p:cTn id="16" fill="hold">
-                            <p:stCondLst>
-                              <p:cond delay="0"/>
-                            </p:stCondLst>
-                            <p:childTnLst>
-                              <p:par>
-                                <p:cTn id="17" presetID="1" presetClass="entr" presetSubtype="0" fill="hold" grpId="0" nodeType="clickEffect">
-                                  <p:stCondLst>
-                                    <p:cond delay="0"/>
-                                  </p:stCondLst>
-                                  <p:childTnLst>
-                                    <p:set>
-                                      <p:cBhvr>
-                                        <p:cTn id="18" dur="1" fill="hold">
-                                          <p:stCondLst>
-                                            <p:cond delay="0"/>
-                                          </p:stCondLst>
-                                        </p:cTn>
-                                        <p:tgtEl>
-                                          <p:spTgt spid="17"/>
-                                        </p:tgtEl>
-                                        <p:attrNameLst>
-                                          <p:attrName>style.visibility</p:attrName>
-                                        </p:attrNameLst>
-                                      </p:cBhvr>
-                                      <p:to>
-                                        <p:strVal val="visible"/>
-                                      </p:to>
-                                    </p:set>
-                                  </p:childTnLst>
-                                </p:cTn>
-                              </p:par>
-                            </p:childTnLst>
-                          </p:cTn>
-                        </p:par>
-                      </p:childTnLst>
-                    </p:cTn>
-                  </p:par>
-                  <p:par>
-                    <p:cTn id="19" fill="hold">
-                      <p:stCondLst>
-                        <p:cond delay="indefinite"/>
-                      </p:stCondLst>
-                      <p:childTnLst>
-                        <p:par>
-                          <p:cTn id="20" fill="hold">
-                            <p:stCondLst>
-                              <p:cond delay="0"/>
-                            </p:stCondLst>
-                            <p:childTnLst>
-                              <p:par>
-                                <p:cTn id="21" presetID="1" presetClass="entr" presetSubtype="0" fill="hold" grpId="0" nodeType="clickEffect">
-                                  <p:stCondLst>
-                                    <p:cond delay="0"/>
-                                  </p:stCondLst>
-                                  <p:childTnLst>
-                                    <p:set>
-                                      <p:cBhvr>
-                                        <p:cTn id="22" dur="1" fill="hold">
-                                          <p:stCondLst>
-                                            <p:cond delay="0"/>
-                                          </p:stCondLst>
-                                        </p:cTn>
-                                        <p:tgtEl>
-                                          <p:spTgt spid="19"/>
-                                        </p:tgtEl>
-                                        <p:attrNameLst>
-                                          <p:attrName>style.visibility</p:attrName>
-                                        </p:attrNameLst>
-                                      </p:cBhvr>
-                                      <p:to>
-                                        <p:strVal val="visible"/>
-                                      </p:to>
-                                    </p:set>
-                                  </p:childTnLst>
-                                </p:cTn>
-                              </p:par>
-                            </p:childTnLst>
-                          </p:cTn>
-                        </p:par>
-                      </p:childTnLst>
-                    </p:cTn>
-                  </p:par>
-                  <p:par>
-                    <p:cTn id="23" fill="hold">
-                      <p:stCondLst>
-                        <p:cond delay="indefinite"/>
-                      </p:stCondLst>
-                      <p:childTnLst>
-                        <p:par>
-                          <p:cTn id="24" fill="hold">
-                            <p:stCondLst>
-                              <p:cond delay="0"/>
-                            </p:stCondLst>
-                            <p:childTnLst>
-                              <p:par>
-                                <p:cTn id="25" presetID="1" presetClass="entr" presetSubtype="0" fill="hold" grpId="0" nodeType="clickEffect">
-                                  <p:stCondLst>
-                                    <p:cond delay="0"/>
-                                  </p:stCondLst>
-                                  <p:childTnLst>
-                                    <p:set>
-                                      <p:cBhvr>
-                                        <p:cTn id="26" dur="1" fill="hold">
-                                          <p:stCondLst>
-                                            <p:cond delay="0"/>
-                                          </p:stCondLst>
-                                        </p:cTn>
-                                        <p:tgtEl>
-                                          <p:spTgt spid="20"/>
+                                          <p:spTgt spid="25"/>
                                         </p:tgtEl>
                                         <p:attrNameLst>
                                           <p:attrName>style.visibility</p:attrName>
@@ -4190,12 +4074,9 @@
       </p:par>
     </p:tnLst>
     <p:bldLst>
+      <p:bldP spid="16" grpId="0" animBg="1"/>
+      <p:bldP spid="25" grpId="0" animBg="1"/>
       <p:bldP spid="23" grpId="0" animBg="1"/>
-      <p:bldP spid="14" grpId="0" animBg="1"/>
-      <p:bldP spid="15" grpId="0" animBg="1"/>
-      <p:bldP spid="17" grpId="0" animBg="1"/>
-      <p:bldP spid="19" grpId="0" animBg="1"/>
-      <p:bldP spid="20" grpId="0" animBg="1"/>
     </p:bldLst>
   </p:timing>
 </p:sld>

</xml_diff>